<commit_message>
fix: update pr image
</commit_message>
<xml_diff>
--- a/pr/ss1.pptx
+++ b/pr/ss1.pptx
@@ -104,6 +104,11 @@
       </a:defRPr>
     </a:lvl9pPr>
   </p:defaultTextStyle>
+  <p:extLst>
+    <p:ext uri="{EFAFB233-063F-42B5-8137-9DF3F51BA10A}">
+      <p15:sldGuideLst xmlns:p15="http://schemas.microsoft.com/office/powerpoint/2012/main"/>
+    </p:ext>
+  </p:extLst>
 </p:presentation>
 </file>
 
@@ -3323,10 +3328,10 @@
       </p:grpSpPr>
       <p:grpSp>
         <p:nvGrpSpPr>
-          <p:cNvPr id="7" name="Group 6">
-            <a:extLst>
-              <a:ext uri="{FF2B5EF4-FFF2-40B4-BE49-F238E27FC236}">
-                <a16:creationId xmlns:a16="http://schemas.microsoft.com/office/drawing/2014/main" id="{0A6083DD-00C7-A340-BD62-EAA04BFE3F1C}"/>
+          <p:cNvPr id="2" name="Group 1">
+            <a:extLst>
+              <a:ext uri="{FF2B5EF4-FFF2-40B4-BE49-F238E27FC236}">
+                <a16:creationId xmlns:a16="http://schemas.microsoft.com/office/drawing/2014/main" id="{6714387C-4B75-314E-A2E9-A1F90EA02C45}"/>
               </a:ext>
             </a:extLst>
           </p:cNvPr>
@@ -3335,10 +3340,10 @@
         </p:nvGrpSpPr>
         <p:grpSpPr>
           <a:xfrm>
-            <a:off x="0" y="14288"/>
-            <a:ext cx="12192000" cy="6858000"/>
-            <a:chOff x="0" y="14288"/>
-            <a:chExt cx="12192000" cy="6858000"/>
+            <a:off x="-6000" y="5975"/>
+            <a:ext cx="12201600" cy="6858000"/>
+            <a:chOff x="-6000" y="5975"/>
+            <a:chExt cx="12201600" cy="6858000"/>
           </a:xfrm>
         </p:grpSpPr>
         <p:pic>
@@ -3363,7 +3368,7 @@
           </p:blipFill>
           <p:spPr>
             <a:xfrm>
-              <a:off x="609600" y="14288"/>
+              <a:off x="609600" y="5975"/>
               <a:ext cx="10972800" cy="6858000"/>
             </a:xfrm>
             <a:prstGeom prst="rect">
@@ -3373,10 +3378,10 @@
         </p:pic>
         <p:sp>
           <p:nvSpPr>
-            <p:cNvPr id="6" name="Rectangle 5">
+            <p:cNvPr id="8" name="Rectangle 7">
               <a:extLst>
                 <a:ext uri="{FF2B5EF4-FFF2-40B4-BE49-F238E27FC236}">
-                  <a16:creationId xmlns:a16="http://schemas.microsoft.com/office/drawing/2014/main" id="{176A02EC-485C-5644-9DE8-44E07E8D9113}"/>
+                  <a16:creationId xmlns:a16="http://schemas.microsoft.com/office/drawing/2014/main" id="{2897EE5E-018C-DF48-952A-B7213D346B48}"/>
                 </a:ext>
               </a:extLst>
             </p:cNvPr>
@@ -3385,8 +3390,8 @@
           </p:nvSpPr>
           <p:spPr>
             <a:xfrm>
-              <a:off x="0" y="5651500"/>
-              <a:ext cx="12192000" cy="1206500"/>
+              <a:off x="0" y="5040000"/>
+              <a:ext cx="12192000" cy="1818000"/>
             </a:xfrm>
             <a:prstGeom prst="rect">
               <a:avLst/>
@@ -3421,31 +3426,323 @@
             <a:lstStyle/>
             <a:p>
               <a:pPr algn="ctr"/>
+              <a:endParaRPr lang="en-US" dirty="0">
+                <a:latin typeface="Hiragino Maru Gothic ProN W4" panose="020F0400000000000000" pitchFamily="34" charset="-128"/>
+                <a:ea typeface="Hiragino Maru Gothic ProN W4" panose="020F0400000000000000" pitchFamily="34" charset="-128"/>
+              </a:endParaRPr>
+            </a:p>
+          </p:txBody>
+        </p:sp>
+        <p:sp>
+          <p:nvSpPr>
+            <p:cNvPr id="9" name="Rectangle 8">
+              <a:extLst>
+                <a:ext uri="{FF2B5EF4-FFF2-40B4-BE49-F238E27FC236}">
+                  <a16:creationId xmlns:a16="http://schemas.microsoft.com/office/drawing/2014/main" id="{B32B0B89-03D6-0A4B-AE35-028502CC31F3}"/>
+                </a:ext>
+              </a:extLst>
+            </p:cNvPr>
+            <p:cNvSpPr/>
+            <p:nvPr/>
+          </p:nvSpPr>
+          <p:spPr>
+            <a:xfrm>
+              <a:off x="0" y="5215435"/>
+              <a:ext cx="12192000" cy="338554"/>
+            </a:xfrm>
+            <a:prstGeom prst="rect">
+              <a:avLst/>
+            </a:prstGeom>
+          </p:spPr>
+          <p:txBody>
+            <a:bodyPr wrap="square">
+              <a:spAutoFit/>
+            </a:bodyPr>
+            <a:lstStyle/>
+            <a:p>
+              <a:pPr algn="ctr"/>
               <a:r>
-                <a:rPr lang="ja-JP" altLang="en-US" sz="2400">
+                <a:rPr lang="ja-JP" altLang="en-US" sz="1600">
+                  <a:solidFill>
+                    <a:schemeClr val="bg1"/>
+                  </a:solidFill>
                   <a:latin typeface="Hiragino Maru Gothic ProN W4" panose="020F0400000000000000" pitchFamily="34" charset="-128"/>
                   <a:ea typeface="Hiragino Maru Gothic ProN W4" panose="020F0400000000000000" pitchFamily="34" charset="-128"/>
                 </a:rPr>
                 <a:t>色とテキストを指定するだけ</a:t>
               </a:r>
               <a:r>
-                <a:rPr lang="en-US" altLang="ja-JP" sz="2400" dirty="0">
+                <a:rPr lang="en-US" altLang="ja-JP" sz="1600" dirty="0">
+                  <a:solidFill>
+                    <a:schemeClr val="bg1"/>
+                  </a:solidFill>
                   <a:latin typeface="Hiragino Maru Gothic ProN W4" panose="020F0400000000000000" pitchFamily="34" charset="-128"/>
                   <a:ea typeface="Hiragino Maru Gothic ProN W4" panose="020F0400000000000000" pitchFamily="34" charset="-128"/>
                 </a:rPr>
                 <a:t>! </a:t>
               </a:r>
               <a:r>
-                <a:rPr lang="ja-JP" altLang="en-US" sz="2400">
+                <a:rPr lang="ja-JP" altLang="en-US" sz="1600">
+                  <a:solidFill>
+                    <a:schemeClr val="bg1"/>
+                  </a:solidFill>
                   <a:latin typeface="Hiragino Maru Gothic ProN W4" panose="020F0400000000000000" pitchFamily="34" charset="-128"/>
                   <a:ea typeface="Hiragino Maru Gothic ProN W4" panose="020F0400000000000000" pitchFamily="34" charset="-128"/>
                 </a:rPr>
                 <a:t>きれいな絵文字を簡単生成♪</a:t>
               </a:r>
-              <a:endParaRPr lang="en-US" sz="2400" dirty="0">
+              <a:endParaRPr lang="en-US" sz="1600" dirty="0">
+                <a:solidFill>
+                  <a:schemeClr val="bg1"/>
+                </a:solidFill>
                 <a:latin typeface="Hiragino Maru Gothic ProN W4" panose="020F0400000000000000" pitchFamily="34" charset="-128"/>
                 <a:ea typeface="Hiragino Maru Gothic ProN W4" panose="020F0400000000000000" pitchFamily="34" charset="-128"/>
               </a:endParaRPr>
+            </a:p>
+          </p:txBody>
+        </p:sp>
+        <p:sp>
+          <p:nvSpPr>
+            <p:cNvPr id="10" name="Rectangle 9">
+              <a:extLst>
+                <a:ext uri="{FF2B5EF4-FFF2-40B4-BE49-F238E27FC236}">
+                  <a16:creationId xmlns:a16="http://schemas.microsoft.com/office/drawing/2014/main" id="{4860D21E-3F1B-FC4B-B23E-09B1DF7DCDD5}"/>
+                </a:ext>
+              </a:extLst>
+            </p:cNvPr>
+            <p:cNvSpPr/>
+            <p:nvPr/>
+          </p:nvSpPr>
+          <p:spPr>
+            <a:xfrm>
+              <a:off x="-6000" y="5641435"/>
+              <a:ext cx="12192000" cy="276999"/>
+            </a:xfrm>
+            <a:prstGeom prst="rect">
+              <a:avLst/>
+            </a:prstGeom>
+          </p:spPr>
+          <p:txBody>
+            <a:bodyPr wrap="square">
+              <a:spAutoFit/>
+            </a:bodyPr>
+            <a:lstStyle/>
+            <a:p>
+              <a:pPr algn="ctr"/>
+              <a:r>
+                <a:rPr lang="ko-KR" altLang="en-US" sz="1200" dirty="0">
+                  <a:solidFill>
+                    <a:schemeClr val="bg1"/>
+                  </a:solidFill>
+                  <a:latin typeface="Hiragino Maru Gothic ProN W4" panose="020F0400000000000000" pitchFamily="34" charset="-128"/>
+                  <a:ea typeface="Hiragino Maru Gothic ProN W4" panose="020F0400000000000000" pitchFamily="34" charset="-128"/>
+                </a:rPr>
+                <a:t>색상과 텍스트를 지정하기 만하면 예쁜 </a:t>
+              </a:r>
+              <a:r>
+                <a:rPr lang="ko-KR" altLang="en-US" sz="1200" dirty="0" err="1">
+                  <a:solidFill>
+                    <a:schemeClr val="bg1"/>
+                  </a:solidFill>
+                  <a:latin typeface="Hiragino Maru Gothic ProN W4" panose="020F0400000000000000" pitchFamily="34" charset="-128"/>
+                  <a:ea typeface="Hiragino Maru Gothic ProN W4" panose="020F0400000000000000" pitchFamily="34" charset="-128"/>
+                </a:rPr>
+                <a:t>이모티콘을</a:t>
+              </a:r>
+              <a:r>
+                <a:rPr lang="ko-KR" altLang="en-US" sz="1200" dirty="0">
+                  <a:solidFill>
+                    <a:schemeClr val="bg1"/>
+                  </a:solidFill>
+                  <a:latin typeface="Hiragino Maru Gothic ProN W4" panose="020F0400000000000000" pitchFamily="34" charset="-128"/>
+                  <a:ea typeface="Hiragino Maru Gothic ProN W4" panose="020F0400000000000000" pitchFamily="34" charset="-128"/>
+                </a:rPr>
+                <a:t> 쉽게 생성 ♪</a:t>
+              </a:r>
+              <a:endParaRPr lang="en-US" sz="1200" dirty="0">
+                <a:solidFill>
+                  <a:schemeClr val="bg1"/>
+                </a:solidFill>
+                <a:latin typeface="Hiragino Maru Gothic ProN W4" panose="020F0400000000000000" pitchFamily="34" charset="-128"/>
+                <a:ea typeface="Hiragino Maru Gothic ProN W4" panose="020F0400000000000000" pitchFamily="34" charset="-128"/>
+              </a:endParaRPr>
+            </a:p>
+          </p:txBody>
+        </p:sp>
+        <p:sp>
+          <p:nvSpPr>
+            <p:cNvPr id="11" name="Rectangle 10">
+              <a:extLst>
+                <a:ext uri="{FF2B5EF4-FFF2-40B4-BE49-F238E27FC236}">
+                  <a16:creationId xmlns:a16="http://schemas.microsoft.com/office/drawing/2014/main" id="{40B34225-4DF4-554C-B2BF-1021BB879AA3}"/>
+                </a:ext>
+              </a:extLst>
+            </p:cNvPr>
+            <p:cNvSpPr/>
+            <p:nvPr/>
+          </p:nvSpPr>
+          <p:spPr>
+            <a:xfrm>
+              <a:off x="-4800" y="6449035"/>
+              <a:ext cx="12192000" cy="276999"/>
+            </a:xfrm>
+            <a:prstGeom prst="rect">
+              <a:avLst/>
+            </a:prstGeom>
+          </p:spPr>
+          <p:txBody>
+            <a:bodyPr wrap="square">
+              <a:spAutoFit/>
+            </a:bodyPr>
+            <a:lstStyle/>
+            <a:p>
+              <a:pPr algn="ctr"/>
+              <a:r>
+                <a:rPr lang="en-US" altLang="ko-KR" sz="1200" dirty="0">
+                  <a:solidFill>
+                    <a:schemeClr val="bg1"/>
+                  </a:solidFill>
+                  <a:latin typeface="Hiragino Maru Gothic ProN W4" panose="020F0400000000000000" pitchFamily="34" charset="-128"/>
+                  <a:ea typeface="Hiragino Maru Gothic ProN W4" panose="020F0400000000000000" pitchFamily="34" charset="-128"/>
+                </a:rPr>
+                <a:t>Just specify the color and text! Easily create pretty </a:t>
+              </a:r>
+              <a:r>
+                <a:rPr lang="en-US" altLang="ko-KR" sz="1200" dirty="0" err="1">
+                  <a:solidFill>
+                    <a:schemeClr val="bg1"/>
+                  </a:solidFill>
+                  <a:latin typeface="Hiragino Maru Gothic ProN W4" panose="020F0400000000000000" pitchFamily="34" charset="-128"/>
+                  <a:ea typeface="Hiragino Maru Gothic ProN W4" panose="020F0400000000000000" pitchFamily="34" charset="-128"/>
+                </a:rPr>
+                <a:t>emoj</a:t>
+              </a:r>
+              <a:r>
+                <a:rPr lang="en-US" altLang="ko-KR" sz="1200" dirty="0">
+                  <a:solidFill>
+                    <a:schemeClr val="bg1"/>
+                  </a:solidFill>
+                  <a:latin typeface="Hiragino Maru Gothic ProN W4" panose="020F0400000000000000" pitchFamily="34" charset="-128"/>
+                  <a:ea typeface="Hiragino Maru Gothic ProN W4" panose="020F0400000000000000" pitchFamily="34" charset="-128"/>
+                </a:rPr>
+                <a:t> </a:t>
+              </a:r>
+              <a:r>
+                <a:rPr lang="en-US" altLang="ko-KR" sz="1200" dirty="0" err="1">
+                  <a:solidFill>
+                    <a:schemeClr val="bg1"/>
+                  </a:solidFill>
+                  <a:latin typeface="Hiragino Maru Gothic ProN W4" panose="020F0400000000000000" pitchFamily="34" charset="-128"/>
+                  <a:ea typeface="Hiragino Maru Gothic ProN W4" panose="020F0400000000000000" pitchFamily="34" charset="-128"/>
+                </a:rPr>
+                <a:t>i</a:t>
+              </a:r>
+              <a:r>
+                <a:rPr lang="en-US" altLang="ko-KR" sz="1200" dirty="0">
+                  <a:solidFill>
+                    <a:schemeClr val="bg1"/>
+                  </a:solidFill>
+                  <a:latin typeface="Hiragino Maru Gothic ProN W4" panose="020F0400000000000000" pitchFamily="34" charset="-128"/>
+                  <a:ea typeface="Hiragino Maru Gothic ProN W4" panose="020F0400000000000000" pitchFamily="34" charset="-128"/>
+                </a:rPr>
+                <a:t>♪</a:t>
+              </a:r>
+              <a:endParaRPr lang="en-US" sz="1200" dirty="0">
+                <a:solidFill>
+                  <a:schemeClr val="bg1"/>
+                </a:solidFill>
+                <a:latin typeface="Hiragino Maru Gothic ProN W4" panose="020F0400000000000000" pitchFamily="34" charset="-128"/>
+                <a:ea typeface="Hiragino Maru Gothic ProN W4" panose="020F0400000000000000" pitchFamily="34" charset="-128"/>
+              </a:endParaRPr>
+            </a:p>
+          </p:txBody>
+        </p:sp>
+        <p:sp>
+          <p:nvSpPr>
+            <p:cNvPr id="12" name="Rectangle 11">
+              <a:extLst>
+                <a:ext uri="{FF2B5EF4-FFF2-40B4-BE49-F238E27FC236}">
+                  <a16:creationId xmlns:a16="http://schemas.microsoft.com/office/drawing/2014/main" id="{798D97EF-508E-214E-9FAA-F1247F8B38FF}"/>
+                </a:ext>
+              </a:extLst>
+            </p:cNvPr>
+            <p:cNvSpPr/>
+            <p:nvPr/>
+          </p:nvSpPr>
+          <p:spPr>
+            <a:xfrm>
+              <a:off x="3600" y="5931835"/>
+              <a:ext cx="12192000" cy="276999"/>
+            </a:xfrm>
+            <a:prstGeom prst="rect">
+              <a:avLst/>
+            </a:prstGeom>
+          </p:spPr>
+          <p:txBody>
+            <a:bodyPr wrap="square">
+              <a:spAutoFit/>
+            </a:bodyPr>
+            <a:lstStyle/>
+            <a:p>
+              <a:pPr algn="ctr"/>
+              <a:r>
+                <a:rPr lang="ja-JP" altLang="en-US" sz="1200">
+                  <a:solidFill>
+                    <a:schemeClr val="bg1"/>
+                  </a:solidFill>
+                  <a:latin typeface="Hiragino Maru Gothic ProN W4" panose="020F0400000000000000" pitchFamily="34" charset="-128"/>
+                  <a:ea typeface="Hiragino Maru Gothic ProN W4" panose="020F0400000000000000" pitchFamily="34" charset="-128"/>
+                </a:rPr>
+                <a:t>只需指定颜色和文字！轻松创建漂亮的表情符号♪</a:t>
+              </a:r>
+              <a:endParaRPr lang="en-US" sz="1200" dirty="0">
+                <a:solidFill>
+                  <a:schemeClr val="bg1"/>
+                </a:solidFill>
+                <a:latin typeface="Hiragino Maru Gothic ProN W4" panose="020F0400000000000000" pitchFamily="34" charset="-128"/>
+                <a:ea typeface="Hiragino Maru Gothic ProN W4" panose="020F0400000000000000" pitchFamily="34" charset="-128"/>
+              </a:endParaRPr>
+            </a:p>
+          </p:txBody>
+        </p:sp>
+        <p:sp>
+          <p:nvSpPr>
+            <p:cNvPr id="13" name="Rectangle 12">
+              <a:extLst>
+                <a:ext uri="{FF2B5EF4-FFF2-40B4-BE49-F238E27FC236}">
+                  <a16:creationId xmlns:a16="http://schemas.microsoft.com/office/drawing/2014/main" id="{E0F7F6EC-1F90-524F-B434-DDFDB21C4BF8}"/>
+                </a:ext>
+              </a:extLst>
+            </p:cNvPr>
+            <p:cNvSpPr/>
+            <p:nvPr/>
+          </p:nvSpPr>
+          <p:spPr>
+            <a:xfrm>
+              <a:off x="-2400" y="6199435"/>
+              <a:ext cx="12192000" cy="276999"/>
+            </a:xfrm>
+            <a:prstGeom prst="rect">
+              <a:avLst/>
+            </a:prstGeom>
+          </p:spPr>
+          <p:txBody>
+            <a:bodyPr wrap="square">
+              <a:spAutoFit/>
+            </a:bodyPr>
+            <a:lstStyle/>
+            <a:p>
+              <a:pPr algn="ctr"/>
+              <a:r>
+                <a:rPr lang="ja-JP" altLang="en-US" sz="1200">
+                  <a:solidFill>
+                    <a:schemeClr val="bg1"/>
+                  </a:solidFill>
+                  <a:latin typeface="Hiragino Maru Gothic ProN W4" panose="020F0400000000000000" pitchFamily="34" charset="-128"/>
+                  <a:ea typeface="Hiragino Maru Gothic ProN W4" panose="020F0400000000000000" pitchFamily="34" charset="-128"/>
+                </a:rPr>
+                <a:t>只需指定顏色和文字！輕鬆創建漂亮的表情符號♪</a:t>
+              </a:r>
             </a:p>
           </p:txBody>
         </p:sp>

</xml_diff>